<commit_message>
[MAJOR] removal of yaml. Support for JSON-formatted title settings in srt
</commit_message>
<xml_diff>
--- a/input/Course/w1/s1/u1/03_Hello_world_PPT_video.pptx
+++ b/input/Course/w1/s1/u1/03_Hello_world_PPT_video.pptx
@@ -5,13 +5,14 @@
     <p:sldMasterId id="2147483648" r:id="rId1"/>
   </p:sldMasterIdLst>
   <p:notesMasterIdLst>
-    <p:notesMasterId r:id="rId6"/>
+    <p:notesMasterId r:id="rId7"/>
   </p:notesMasterIdLst>
   <p:sldIdLst>
-    <p:sldId id="256" r:id="rId2"/>
-    <p:sldId id="257" r:id="rId3"/>
-    <p:sldId id="258" r:id="rId4"/>
-    <p:sldId id="259" r:id="rId5"/>
+    <p:sldId id="260" r:id="rId2"/>
+    <p:sldId id="256" r:id="rId3"/>
+    <p:sldId id="257" r:id="rId4"/>
+    <p:sldId id="258" r:id="rId5"/>
+    <p:sldId id="259" r:id="rId6"/>
   </p:sldIdLst>
   <p:sldSz cx="12192000" cy="6858000"/>
   <p:notesSz cx="6858000" cy="9144000"/>
@@ -118,6 +119,35 @@
 </p:presentation>
 </file>
 
+<file path=ppt/revisionInfo.xml><?xml version="1.0" encoding="utf-8"?>
+<p1510:revInfo xmlns:a="http://schemas.openxmlformats.org/drawingml/2006/main" xmlns:r="http://schemas.openxmlformats.org/officeDocument/2006/relationships" xmlns:p1510="http://schemas.microsoft.com/office/powerpoint/2015/10/main">
+  <p1510:revLst>
+    <p1510:client id="{4160929A-66B3-4973-9BD4-E698E421CEF1}" v="2" dt="2019-12-05T04:29:11.739"/>
+  </p1510:revLst>
+</p1510:revInfo>
+</file>
+
+<file path=ppt/changesInfos/changesInfo1.xml><?xml version="1.0" encoding="utf-8"?>
+<pc:chgInfo xmlns:a="http://schemas.openxmlformats.org/drawingml/2006/main" xmlns:r="http://schemas.openxmlformats.org/officeDocument/2006/relationships" xmlns:ac="http://schemas.microsoft.com/office/drawing/2013/main/command" xmlns:pc="http://schemas.microsoft.com/office/powerpoint/2013/main/command">
+  <pc:docChgLst>
+    <pc:chgData name="Derek Pung" userId="7e88d8518b7a3141" providerId="LiveId" clId="{4160929A-66B3-4973-9BD4-E698E421CEF1}"/>
+    <pc:docChg chg="custSel addSld modSld">
+      <pc:chgData name="Derek Pung" userId="7e88d8518b7a3141" providerId="LiveId" clId="{4160929A-66B3-4973-9BD4-E698E421CEF1}" dt="2019-12-05T04:47:26.972" v="32" actId="313"/>
+      <pc:docMkLst>
+        <pc:docMk/>
+      </pc:docMkLst>
+      <pc:sldChg chg="add modNotesTx">
+        <pc:chgData name="Derek Pung" userId="7e88d8518b7a3141" providerId="LiveId" clId="{4160929A-66B3-4973-9BD4-E698E421CEF1}" dt="2019-12-05T04:47:26.972" v="32" actId="313"/>
+        <pc:sldMkLst>
+          <pc:docMk/>
+          <pc:sldMk cId="2738298612" sldId="260"/>
+        </pc:sldMkLst>
+      </pc:sldChg>
+    </pc:docChg>
+  </pc:docChgLst>
+</pc:chgInfo>
+</file>
+
 <file path=ppt/notesMasters/notesMaster1.xml><?xml version="1.0" encoding="utf-8"?>
 <p:notesMaster xmlns:a="http://schemas.openxmlformats.org/drawingml/2006/main" xmlns:r="http://schemas.openxmlformats.org/officeDocument/2006/relationships" xmlns:p="http://schemas.openxmlformats.org/presentationml/2006/main">
   <p:cSld>
@@ -200,7 +230,7 @@
           <a:p>
             <a:fld id="{1EE4D481-980E-49BF-85FB-F749DAA9CC8E}" type="datetimeFigureOut">
               <a:rPr lang="en-US" smtClean="0"/>
-              <a:t>11/28/2019</a:t>
+              <a:t>12/5/2019</a:t>
             </a:fld>
             <a:endParaRPr lang="en-US"/>
           </a:p>
@@ -513,8 +543,33 @@
           <a:p>
             <a:r>
               <a:rPr lang="en-US" dirty="0"/>
-              <a:t>This is a test</a:t>
-            </a:r>
+              <a:t>{“</a:t>
+            </a:r>
+            <a:r>
+              <a:rPr lang="en-US" dirty="0" err="1"/>
+              <a:t>video_file_name</a:t>
+            </a:r>
+            <a:r>
+              <a:rPr lang="en-US" dirty="0"/>
+              <a:t>”: “03_Hello_world_PPT_video”, “</a:t>
+            </a:r>
+            <a:r>
+              <a:rPr lang="en-US" dirty="0" err="1"/>
+              <a:t>display_name</a:t>
+            </a:r>
+            <a:r>
+              <a:rPr lang="en-US"/>
+              <a:t>”: “Hello world”, </a:t>
+            </a:r>
+            <a:r>
+              <a:rPr lang="en-US" dirty="0"/>
+              <a:t>“voice</a:t>
+            </a:r>
+            <a:r>
+              <a:rPr lang="en-US"/>
+              <a:t>”: “3”}</a:t>
+            </a:r>
+            <a:endParaRPr lang="en-US" dirty="0"/>
           </a:p>
         </p:txBody>
       </p:sp>
@@ -544,7 +599,7 @@
     </p:spTree>
     <p:extLst>
       <p:ext uri="{BB962C8B-B14F-4D97-AF65-F5344CB8AC3E}">
-        <p14:creationId xmlns:p14="http://schemas.microsoft.com/office/powerpoint/2010/main" val="2912703615"/>
+        <p14:creationId xmlns:p14="http://schemas.microsoft.com/office/powerpoint/2010/main" val="3617708728"/>
       </p:ext>
     </p:extLst>
   </p:cSld>
@@ -600,7 +655,7 @@
           <a:p>
             <a:r>
               <a:rPr lang="en-US" dirty="0"/>
-              <a:t>Skipping next comment</a:t>
+              <a:t>This is a test</a:t>
             </a:r>
           </a:p>
         </p:txBody>
@@ -631,7 +686,7 @@
     </p:spTree>
     <p:extLst>
       <p:ext uri="{BB962C8B-B14F-4D97-AF65-F5344CB8AC3E}">
-        <p14:creationId xmlns:p14="http://schemas.microsoft.com/office/powerpoint/2010/main" val="3152831807"/>
+        <p14:creationId xmlns:p14="http://schemas.microsoft.com/office/powerpoint/2010/main" val="2912703615"/>
       </p:ext>
     </p:extLst>
   </p:cSld>
@@ -686,10 +741,9 @@
           <a:lstStyle/>
           <a:p>
             <a:r>
-              <a:rPr lang="en-US"/>
-              <a:t>123</a:t>
-            </a:r>
-            <a:endParaRPr lang="en-SG"/>
+              <a:rPr lang="en-US" dirty="0"/>
+              <a:t>Skipping next comment</a:t>
+            </a:r>
           </a:p>
         </p:txBody>
       </p:sp>
@@ -719,7 +773,7 @@
     </p:spTree>
     <p:extLst>
       <p:ext uri="{BB962C8B-B14F-4D97-AF65-F5344CB8AC3E}">
-        <p14:creationId xmlns:p14="http://schemas.microsoft.com/office/powerpoint/2010/main" val="2201671042"/>
+        <p14:creationId xmlns:p14="http://schemas.microsoft.com/office/powerpoint/2010/main" val="3152831807"/>
       </p:ext>
     </p:extLst>
   </p:cSld>
@@ -774,9 +828,10 @@
           <a:lstStyle/>
           <a:p>
             <a:r>
-              <a:rPr lang="en-US" dirty="0"/>
-              <a:t>Skipped previous comment</a:t>
-            </a:r>
+              <a:rPr lang="en-US"/>
+              <a:t>123</a:t>
+            </a:r>
+            <a:endParaRPr lang="en-SG"/>
           </a:p>
         </p:txBody>
       </p:sp>
@@ -798,6 +853,93 @@
             <a:fld id="{D4F25122-F43B-415E-BBCD-EA4B2BA820B8}" type="slidenum">
               <a:rPr lang="en-US" smtClean="0"/>
               <a:t>4</a:t>
+            </a:fld>
+            <a:endParaRPr lang="en-US"/>
+          </a:p>
+        </p:txBody>
+      </p:sp>
+    </p:spTree>
+    <p:extLst>
+      <p:ext uri="{BB962C8B-B14F-4D97-AF65-F5344CB8AC3E}">
+        <p14:creationId xmlns:p14="http://schemas.microsoft.com/office/powerpoint/2010/main" val="2201671042"/>
+      </p:ext>
+    </p:extLst>
+  </p:cSld>
+  <p:clrMapOvr>
+    <a:masterClrMapping/>
+  </p:clrMapOvr>
+</p:notes>
+</file>
+
+<file path=ppt/notesSlides/notesSlide5.xml><?xml version="1.0" encoding="utf-8"?>
+<p:notes xmlns:a="http://schemas.openxmlformats.org/drawingml/2006/main" xmlns:r="http://schemas.openxmlformats.org/officeDocument/2006/relationships" xmlns:p="http://schemas.openxmlformats.org/presentationml/2006/main">
+  <p:cSld>
+    <p:spTree>
+      <p:nvGrpSpPr>
+        <p:cNvPr id="1" name=""/>
+        <p:cNvGrpSpPr/>
+        <p:nvPr/>
+      </p:nvGrpSpPr>
+      <p:grpSpPr>
+        <a:xfrm>
+          <a:off x="0" y="0"/>
+          <a:ext cx="0" cy="0"/>
+          <a:chOff x="0" y="0"/>
+          <a:chExt cx="0" cy="0"/>
+        </a:xfrm>
+      </p:grpSpPr>
+      <p:sp>
+        <p:nvSpPr>
+          <p:cNvPr id="2" name="Slide Image Placeholder 1"/>
+          <p:cNvSpPr>
+            <a:spLocks noGrp="1" noRot="1" noChangeAspect="1"/>
+          </p:cNvSpPr>
+          <p:nvPr>
+            <p:ph type="sldImg"/>
+          </p:nvPr>
+        </p:nvSpPr>
+        <p:spPr/>
+      </p:sp>
+      <p:sp>
+        <p:nvSpPr>
+          <p:cNvPr id="3" name="Notes Placeholder 2"/>
+          <p:cNvSpPr>
+            <a:spLocks noGrp="1"/>
+          </p:cNvSpPr>
+          <p:nvPr>
+            <p:ph type="body" idx="1"/>
+          </p:nvPr>
+        </p:nvSpPr>
+        <p:spPr/>
+        <p:txBody>
+          <a:bodyPr/>
+          <a:lstStyle/>
+          <a:p>
+            <a:r>
+              <a:rPr lang="en-US" dirty="0"/>
+              <a:t>Skipped previous comment</a:t>
+            </a:r>
+          </a:p>
+        </p:txBody>
+      </p:sp>
+      <p:sp>
+        <p:nvSpPr>
+          <p:cNvPr id="4" name="Slide Number Placeholder 3"/>
+          <p:cNvSpPr>
+            <a:spLocks noGrp="1"/>
+          </p:cNvSpPr>
+          <p:nvPr>
+            <p:ph type="sldNum" sz="quarter" idx="5"/>
+          </p:nvPr>
+        </p:nvSpPr>
+        <p:spPr/>
+        <p:txBody>
+          <a:bodyPr/>
+          <a:lstStyle/>
+          <a:p>
+            <a:fld id="{D4F25122-F43B-415E-BBCD-EA4B2BA820B8}" type="slidenum">
+              <a:rPr lang="en-US" smtClean="0"/>
+              <a:t>5</a:t>
             </a:fld>
             <a:endParaRPr lang="en-US"/>
           </a:p>
@@ -963,7 +1105,7 @@
           <a:p>
             <a:fld id="{35DC08F3-965F-4DEA-9B61-4E5F756BB3EE}" type="datetimeFigureOut">
               <a:rPr lang="en-US" smtClean="0"/>
-              <a:t>11/28/2019</a:t>
+              <a:t>12/5/2019</a:t>
             </a:fld>
             <a:endParaRPr lang="en-US"/>
           </a:p>
@@ -1161,7 +1303,7 @@
           <a:p>
             <a:fld id="{35DC08F3-965F-4DEA-9B61-4E5F756BB3EE}" type="datetimeFigureOut">
               <a:rPr lang="en-US" smtClean="0"/>
-              <a:t>11/28/2019</a:t>
+              <a:t>12/5/2019</a:t>
             </a:fld>
             <a:endParaRPr lang="en-US"/>
           </a:p>
@@ -1369,7 +1511,7 @@
           <a:p>
             <a:fld id="{35DC08F3-965F-4DEA-9B61-4E5F756BB3EE}" type="datetimeFigureOut">
               <a:rPr lang="en-US" smtClean="0"/>
-              <a:t>11/28/2019</a:t>
+              <a:t>12/5/2019</a:t>
             </a:fld>
             <a:endParaRPr lang="en-US"/>
           </a:p>
@@ -1567,7 +1709,7 @@
           <a:p>
             <a:fld id="{35DC08F3-965F-4DEA-9B61-4E5F756BB3EE}" type="datetimeFigureOut">
               <a:rPr lang="en-US" smtClean="0"/>
-              <a:t>11/28/2019</a:t>
+              <a:t>12/5/2019</a:t>
             </a:fld>
             <a:endParaRPr lang="en-US"/>
           </a:p>
@@ -1842,7 +1984,7 @@
           <a:p>
             <a:fld id="{35DC08F3-965F-4DEA-9B61-4E5F756BB3EE}" type="datetimeFigureOut">
               <a:rPr lang="en-US" smtClean="0"/>
-              <a:t>11/28/2019</a:t>
+              <a:t>12/5/2019</a:t>
             </a:fld>
             <a:endParaRPr lang="en-US"/>
           </a:p>
@@ -2107,7 +2249,7 @@
           <a:p>
             <a:fld id="{35DC08F3-965F-4DEA-9B61-4E5F756BB3EE}" type="datetimeFigureOut">
               <a:rPr lang="en-US" smtClean="0"/>
-              <a:t>11/28/2019</a:t>
+              <a:t>12/5/2019</a:t>
             </a:fld>
             <a:endParaRPr lang="en-US"/>
           </a:p>
@@ -2519,7 +2661,7 @@
           <a:p>
             <a:fld id="{35DC08F3-965F-4DEA-9B61-4E5F756BB3EE}" type="datetimeFigureOut">
               <a:rPr lang="en-US" smtClean="0"/>
-              <a:t>11/28/2019</a:t>
+              <a:t>12/5/2019</a:t>
             </a:fld>
             <a:endParaRPr lang="en-US"/>
           </a:p>
@@ -2660,7 +2802,7 @@
           <a:p>
             <a:fld id="{35DC08F3-965F-4DEA-9B61-4E5F756BB3EE}" type="datetimeFigureOut">
               <a:rPr lang="en-US" smtClean="0"/>
-              <a:t>11/28/2019</a:t>
+              <a:t>12/5/2019</a:t>
             </a:fld>
             <a:endParaRPr lang="en-US"/>
           </a:p>
@@ -2773,7 +2915,7 @@
           <a:p>
             <a:fld id="{35DC08F3-965F-4DEA-9B61-4E5F756BB3EE}" type="datetimeFigureOut">
               <a:rPr lang="en-US" smtClean="0"/>
-              <a:t>11/28/2019</a:t>
+              <a:t>12/5/2019</a:t>
             </a:fld>
             <a:endParaRPr lang="en-US"/>
           </a:p>
@@ -3084,7 +3226,7 @@
           <a:p>
             <a:fld id="{35DC08F3-965F-4DEA-9B61-4E5F756BB3EE}" type="datetimeFigureOut">
               <a:rPr lang="en-US" smtClean="0"/>
-              <a:t>11/28/2019</a:t>
+              <a:t>12/5/2019</a:t>
             </a:fld>
             <a:endParaRPr lang="en-US"/>
           </a:p>
@@ -3372,7 +3514,7 @@
           <a:p>
             <a:fld id="{35DC08F3-965F-4DEA-9B61-4E5F756BB3EE}" type="datetimeFigureOut">
               <a:rPr lang="en-US" smtClean="0"/>
-              <a:t>11/28/2019</a:t>
+              <a:t>12/5/2019</a:t>
             </a:fld>
             <a:endParaRPr lang="en-US"/>
           </a:p>
@@ -3613,7 +3755,7 @@
           <a:p>
             <a:fld id="{35DC08F3-965F-4DEA-9B61-4E5F756BB3EE}" type="datetimeFigureOut">
               <a:rPr lang="en-US" smtClean="0"/>
-              <a:t>11/28/2019</a:t>
+              <a:t>12/5/2019</a:t>
             </a:fld>
             <a:endParaRPr lang="en-US"/>
           </a:p>
@@ -4035,7 +4177,7 @@
           <p:cNvPr id="2" name="Title 1">
             <a:extLst>
               <a:ext uri="{FF2B5EF4-FFF2-40B4-BE49-F238E27FC236}">
-                <a16:creationId xmlns:a16="http://schemas.microsoft.com/office/drawing/2014/main" id="{C584AF0F-1C66-4473-8DCF-9363533AB9CC}"/>
+                <a16:creationId xmlns:a16="http://schemas.microsoft.com/office/drawing/2014/main" id="{FC777DA3-453B-46B9-AFE7-19A5799DB440}"/>
               </a:ext>
             </a:extLst>
           </p:cNvPr>
@@ -4051,10 +4193,7 @@
           <a:bodyPr/>
           <a:lstStyle/>
           <a:p>
-            <a:r>
-              <a:rPr lang="en-US" dirty="0"/>
-              <a:t>Hello world</a:t>
-            </a:r>
+            <a:endParaRPr lang="en-US"/>
           </a:p>
         </p:txBody>
       </p:sp>
@@ -4063,7 +4202,7 @@
           <p:cNvPr id="3" name="Subtitle 2">
             <a:extLst>
               <a:ext uri="{FF2B5EF4-FFF2-40B4-BE49-F238E27FC236}">
-                <a16:creationId xmlns:a16="http://schemas.microsoft.com/office/drawing/2014/main" id="{E3E4EF17-A207-4C66-961F-BA6A56678BA5}"/>
+                <a16:creationId xmlns:a16="http://schemas.microsoft.com/office/drawing/2014/main" id="{570D260E-87B8-4479-9C82-335410E3A64E}"/>
               </a:ext>
             </a:extLst>
           </p:cNvPr>
@@ -4086,7 +4225,7 @@
     </p:spTree>
     <p:extLst>
       <p:ext uri="{BB962C8B-B14F-4D97-AF65-F5344CB8AC3E}">
-        <p14:creationId xmlns:p14="http://schemas.microsoft.com/office/powerpoint/2010/main" val="2872330192"/>
+        <p14:creationId xmlns:p14="http://schemas.microsoft.com/office/powerpoint/2010/main" val="2738298612"/>
       </p:ext>
     </p:extLst>
   </p:cSld>
@@ -4118,15 +4257,15 @@
           <p:cNvPr id="2" name="Title 1">
             <a:extLst>
               <a:ext uri="{FF2B5EF4-FFF2-40B4-BE49-F238E27FC236}">
-                <a16:creationId xmlns:a16="http://schemas.microsoft.com/office/drawing/2014/main" id="{AF245F81-A1A5-446E-9F14-559D2C15AC23}"/>
-              </a:ext>
-            </a:extLst>
-          </p:cNvPr>
-          <p:cNvSpPr>
-            <a:spLocks noGrp="1"/>
-          </p:cNvSpPr>
-          <p:nvPr>
-            <p:ph type="title"/>
+                <a16:creationId xmlns:a16="http://schemas.microsoft.com/office/drawing/2014/main" id="{C584AF0F-1C66-4473-8DCF-9363533AB9CC}"/>
+              </a:ext>
+            </a:extLst>
+          </p:cNvPr>
+          <p:cNvSpPr>
+            <a:spLocks noGrp="1"/>
+          </p:cNvSpPr>
+          <p:nvPr>
+            <p:ph type="ctrTitle"/>
           </p:nvPr>
         </p:nvSpPr>
         <p:spPr/>
@@ -4136,25 +4275,25 @@
           <a:p>
             <a:r>
               <a:rPr lang="en-US" dirty="0"/>
-              <a:t>blank</a:t>
-            </a:r>
-          </a:p>
-        </p:txBody>
-      </p:sp>
-      <p:sp>
-        <p:nvSpPr>
-          <p:cNvPr id="3" name="Content Placeholder 2">
-            <a:extLst>
-              <a:ext uri="{FF2B5EF4-FFF2-40B4-BE49-F238E27FC236}">
-                <a16:creationId xmlns:a16="http://schemas.microsoft.com/office/drawing/2014/main" id="{105BF9C6-084E-4AA7-8275-7F10E250D837}"/>
-              </a:ext>
-            </a:extLst>
-          </p:cNvPr>
-          <p:cNvSpPr>
-            <a:spLocks noGrp="1"/>
-          </p:cNvSpPr>
-          <p:nvPr>
-            <p:ph idx="1"/>
+              <a:t>Hello world</a:t>
+            </a:r>
+          </a:p>
+        </p:txBody>
+      </p:sp>
+      <p:sp>
+        <p:nvSpPr>
+          <p:cNvPr id="3" name="Subtitle 2">
+            <a:extLst>
+              <a:ext uri="{FF2B5EF4-FFF2-40B4-BE49-F238E27FC236}">
+                <a16:creationId xmlns:a16="http://schemas.microsoft.com/office/drawing/2014/main" id="{E3E4EF17-A207-4C66-961F-BA6A56678BA5}"/>
+              </a:ext>
+            </a:extLst>
+          </p:cNvPr>
+          <p:cNvSpPr>
+            <a:spLocks noGrp="1"/>
+          </p:cNvSpPr>
+          <p:nvPr>
+            <p:ph type="subTitle" idx="1"/>
           </p:nvPr>
         </p:nvSpPr>
         <p:spPr/>
@@ -4169,7 +4308,7 @@
     </p:spTree>
     <p:extLst>
       <p:ext uri="{BB962C8B-B14F-4D97-AF65-F5344CB8AC3E}">
-        <p14:creationId xmlns:p14="http://schemas.microsoft.com/office/powerpoint/2010/main" val="335587732"/>
+        <p14:creationId xmlns:p14="http://schemas.microsoft.com/office/powerpoint/2010/main" val="2872330192"/>
       </p:ext>
     </p:extLst>
   </p:cSld>
@@ -4201,6 +4340,89 @@
           <p:cNvPr id="2" name="Title 1">
             <a:extLst>
               <a:ext uri="{FF2B5EF4-FFF2-40B4-BE49-F238E27FC236}">
+                <a16:creationId xmlns:a16="http://schemas.microsoft.com/office/drawing/2014/main" id="{AF245F81-A1A5-446E-9F14-559D2C15AC23}"/>
+              </a:ext>
+            </a:extLst>
+          </p:cNvPr>
+          <p:cNvSpPr>
+            <a:spLocks noGrp="1"/>
+          </p:cNvSpPr>
+          <p:nvPr>
+            <p:ph type="title"/>
+          </p:nvPr>
+        </p:nvSpPr>
+        <p:spPr/>
+        <p:txBody>
+          <a:bodyPr/>
+          <a:lstStyle/>
+          <a:p>
+            <a:r>
+              <a:rPr lang="en-US" dirty="0"/>
+              <a:t>blank</a:t>
+            </a:r>
+          </a:p>
+        </p:txBody>
+      </p:sp>
+      <p:sp>
+        <p:nvSpPr>
+          <p:cNvPr id="3" name="Content Placeholder 2">
+            <a:extLst>
+              <a:ext uri="{FF2B5EF4-FFF2-40B4-BE49-F238E27FC236}">
+                <a16:creationId xmlns:a16="http://schemas.microsoft.com/office/drawing/2014/main" id="{105BF9C6-084E-4AA7-8275-7F10E250D837}"/>
+              </a:ext>
+            </a:extLst>
+          </p:cNvPr>
+          <p:cNvSpPr>
+            <a:spLocks noGrp="1"/>
+          </p:cNvSpPr>
+          <p:nvPr>
+            <p:ph idx="1"/>
+          </p:nvPr>
+        </p:nvSpPr>
+        <p:spPr/>
+        <p:txBody>
+          <a:bodyPr/>
+          <a:lstStyle/>
+          <a:p>
+            <a:endParaRPr lang="en-US"/>
+          </a:p>
+        </p:txBody>
+      </p:sp>
+    </p:spTree>
+    <p:extLst>
+      <p:ext uri="{BB962C8B-B14F-4D97-AF65-F5344CB8AC3E}">
+        <p14:creationId xmlns:p14="http://schemas.microsoft.com/office/powerpoint/2010/main" val="335587732"/>
+      </p:ext>
+    </p:extLst>
+  </p:cSld>
+  <p:clrMapOvr>
+    <a:masterClrMapping/>
+  </p:clrMapOvr>
+</p:sld>
+</file>
+
+<file path=ppt/slides/slide4.xml><?xml version="1.0" encoding="utf-8"?>
+<p:sld xmlns:a="http://schemas.openxmlformats.org/drawingml/2006/main" xmlns:r="http://schemas.openxmlformats.org/officeDocument/2006/relationships" xmlns:p="http://schemas.openxmlformats.org/presentationml/2006/main">
+  <p:cSld>
+    <p:spTree>
+      <p:nvGrpSpPr>
+        <p:cNvPr id="1" name=""/>
+        <p:cNvGrpSpPr/>
+        <p:nvPr/>
+      </p:nvGrpSpPr>
+      <p:grpSpPr>
+        <a:xfrm>
+          <a:off x="0" y="0"/>
+          <a:ext cx="0" cy="0"/>
+          <a:chOff x="0" y="0"/>
+          <a:chExt cx="0" cy="0"/>
+        </a:xfrm>
+      </p:grpSpPr>
+      <p:sp>
+        <p:nvSpPr>
+          <p:cNvPr id="2" name="Title 1">
+            <a:extLst>
+              <a:ext uri="{FF2B5EF4-FFF2-40B4-BE49-F238E27FC236}">
                 <a16:creationId xmlns:a16="http://schemas.microsoft.com/office/drawing/2014/main" id="{A1CC6535-5B58-44B7-9072-C89426C99CE4}"/>
               </a:ext>
             </a:extLst>
@@ -4262,7 +4484,7 @@
 </p:sld>
 </file>
 
-<file path=ppt/slides/slide4.xml><?xml version="1.0" encoding="utf-8"?>
+<file path=ppt/slides/slide5.xml><?xml version="1.0" encoding="utf-8"?>
 <p:sld xmlns:a="http://schemas.openxmlformats.org/drawingml/2006/main" xmlns:r="http://schemas.openxmlformats.org/officeDocument/2006/relationships" xmlns:p="http://schemas.openxmlformats.org/presentationml/2006/main">
   <p:cSld>
     <p:spTree>

</xml_diff>

<commit_message>
[test] Tests done for pptx with break titles
</commit_message>
<xml_diff>
--- a/input/Course/w1/s1/u1/03_Hello_world_PPT_video.pptx
+++ b/input/Course/w1/s1/u1/03_Hello_world_PPT_video.pptx
@@ -5,14 +5,15 @@
     <p:sldMasterId id="2147483648" r:id="rId1"/>
   </p:sldMasterIdLst>
   <p:notesMasterIdLst>
-    <p:notesMasterId r:id="rId7"/>
+    <p:notesMasterId r:id="rId8"/>
   </p:notesMasterIdLst>
   <p:sldIdLst>
     <p:sldId id="260" r:id="rId2"/>
     <p:sldId id="256" r:id="rId3"/>
     <p:sldId id="257" r:id="rId4"/>
     <p:sldId id="258" r:id="rId5"/>
-    <p:sldId id="259" r:id="rId6"/>
+    <p:sldId id="261" r:id="rId6"/>
+    <p:sldId id="259" r:id="rId7"/>
   </p:sldIdLst>
   <p:sldSz cx="12192000" cy="6858000"/>
   <p:notesSz cx="6858000" cy="9144000"/>
@@ -122,7 +123,7 @@
 <file path=ppt/revisionInfo.xml><?xml version="1.0" encoding="utf-8"?>
 <p1510:revInfo xmlns:a="http://schemas.openxmlformats.org/drawingml/2006/main" xmlns:r="http://schemas.openxmlformats.org/officeDocument/2006/relationships" xmlns:p1510="http://schemas.microsoft.com/office/powerpoint/2015/10/main">
   <p1510:revLst>
-    <p1510:client id="{4160929A-66B3-4973-9BD4-E698E421CEF1}" v="2" dt="2019-12-05T04:29:11.739"/>
+    <p1510:client id="{4160929A-66B3-4973-9BD4-E698E421CEF1}" v="4" dt="2019-12-05T11:22:50.572"/>
   </p1510:revLst>
 </p1510:revInfo>
 </file>
@@ -132,7 +133,7 @@
   <pc:docChgLst>
     <pc:chgData name="Derek Pung" userId="7e88d8518b7a3141" providerId="LiveId" clId="{4160929A-66B3-4973-9BD4-E698E421CEF1}"/>
     <pc:docChg chg="custSel addSld modSld">
-      <pc:chgData name="Derek Pung" userId="7e88d8518b7a3141" providerId="LiveId" clId="{4160929A-66B3-4973-9BD4-E698E421CEF1}" dt="2019-12-05T04:47:26.972" v="32" actId="313"/>
+      <pc:chgData name="Derek Pung" userId="7e88d8518b7a3141" providerId="LiveId" clId="{4160929A-66B3-4973-9BD4-E698E421CEF1}" dt="2019-12-05T11:33:09.792" v="58" actId="20577"/>
       <pc:docMkLst>
         <pc:docMk/>
       </pc:docMkLst>
@@ -141,6 +142,13 @@
         <pc:sldMkLst>
           <pc:docMk/>
           <pc:sldMk cId="2738298612" sldId="260"/>
+        </pc:sldMkLst>
+      </pc:sldChg>
+      <pc:sldChg chg="add modNotesTx">
+        <pc:chgData name="Derek Pung" userId="7e88d8518b7a3141" providerId="LiveId" clId="{4160929A-66B3-4973-9BD4-E698E421CEF1}" dt="2019-12-05T11:33:09.792" v="58" actId="20577"/>
+        <pc:sldMkLst>
+          <pc:docMk/>
+          <pc:sldMk cId="1249608323" sldId="261"/>
         </pc:sldMkLst>
       </pc:sldChg>
     </pc:docChg>
@@ -558,18 +566,9 @@
               <a:t>display_name</a:t>
             </a:r>
             <a:r>
-              <a:rPr lang="en-US"/>
-              <a:t>”: “Hello world”, </a:t>
-            </a:r>
-            <a:r>
               <a:rPr lang="en-US" dirty="0"/>
-              <a:t>“voice</a:t>
-            </a:r>
-            <a:r>
-              <a:rPr lang="en-US"/>
-              <a:t>”: “3”}</a:t>
-            </a:r>
-            <a:endParaRPr lang="en-US" dirty="0"/>
+              <a:t>”: “Hello world”, “voice”: “3”}</a:t>
+            </a:r>
           </a:p>
         </p:txBody>
       </p:sp>
@@ -915,10 +914,36 @@
           <a:bodyPr/>
           <a:lstStyle/>
           <a:p>
+            <a:pPr marL="0" marR="0" lvl="0" indent="0" algn="l" defTabSz="914400" rtl="0" eaLnBrk="1" fontAlgn="auto" latinLnBrk="0" hangingPunct="1">
+              <a:lnSpc>
+                <a:spcPct val="100000"/>
+              </a:lnSpc>
+              <a:spcBef>
+                <a:spcPts val="0"/>
+              </a:spcBef>
+              <a:spcAft>
+                <a:spcPts val="0"/>
+              </a:spcAft>
+              <a:buClrTx/>
+              <a:buSzTx/>
+              <a:buFontTx/>
+              <a:buNone/>
+              <a:tabLst/>
+              <a:defRPr/>
+            </a:pPr>
             <a:r>
               <a:rPr lang="en-US" dirty="0"/>
-              <a:t>Skipped previous comment</a:t>
-            </a:r>
+              <a:t>{“</a:t>
+            </a:r>
+            <a:r>
+              <a:rPr lang="en-US" dirty="0" err="1"/>
+              <a:t>display_name</a:t>
+            </a:r>
+            <a:r>
+              <a:rPr lang="en-US"/>
+              <a:t>”: “BREAK TITLEEE”}</a:t>
+            </a:r>
+            <a:endParaRPr lang="en-US" dirty="0"/>
           </a:p>
         </p:txBody>
       </p:sp>
@@ -940,6 +965,93 @@
             <a:fld id="{D4F25122-F43B-415E-BBCD-EA4B2BA820B8}" type="slidenum">
               <a:rPr lang="en-US" smtClean="0"/>
               <a:t>5</a:t>
+            </a:fld>
+            <a:endParaRPr lang="en-US"/>
+          </a:p>
+        </p:txBody>
+      </p:sp>
+    </p:spTree>
+    <p:extLst>
+      <p:ext uri="{BB962C8B-B14F-4D97-AF65-F5344CB8AC3E}">
+        <p14:creationId xmlns:p14="http://schemas.microsoft.com/office/powerpoint/2010/main" val="3121118291"/>
+      </p:ext>
+    </p:extLst>
+  </p:cSld>
+  <p:clrMapOvr>
+    <a:masterClrMapping/>
+  </p:clrMapOvr>
+</p:notes>
+</file>
+
+<file path=ppt/notesSlides/notesSlide6.xml><?xml version="1.0" encoding="utf-8"?>
+<p:notes xmlns:a="http://schemas.openxmlformats.org/drawingml/2006/main" xmlns:r="http://schemas.openxmlformats.org/officeDocument/2006/relationships" xmlns:p="http://schemas.openxmlformats.org/presentationml/2006/main">
+  <p:cSld>
+    <p:spTree>
+      <p:nvGrpSpPr>
+        <p:cNvPr id="1" name=""/>
+        <p:cNvGrpSpPr/>
+        <p:nvPr/>
+      </p:nvGrpSpPr>
+      <p:grpSpPr>
+        <a:xfrm>
+          <a:off x="0" y="0"/>
+          <a:ext cx="0" cy="0"/>
+          <a:chOff x="0" y="0"/>
+          <a:chExt cx="0" cy="0"/>
+        </a:xfrm>
+      </p:grpSpPr>
+      <p:sp>
+        <p:nvSpPr>
+          <p:cNvPr id="2" name="Slide Image Placeholder 1"/>
+          <p:cNvSpPr>
+            <a:spLocks noGrp="1" noRot="1" noChangeAspect="1"/>
+          </p:cNvSpPr>
+          <p:nvPr>
+            <p:ph type="sldImg"/>
+          </p:nvPr>
+        </p:nvSpPr>
+        <p:spPr/>
+      </p:sp>
+      <p:sp>
+        <p:nvSpPr>
+          <p:cNvPr id="3" name="Notes Placeholder 2"/>
+          <p:cNvSpPr>
+            <a:spLocks noGrp="1"/>
+          </p:cNvSpPr>
+          <p:nvPr>
+            <p:ph type="body" idx="1"/>
+          </p:nvPr>
+        </p:nvSpPr>
+        <p:spPr/>
+        <p:txBody>
+          <a:bodyPr/>
+          <a:lstStyle/>
+          <a:p>
+            <a:r>
+              <a:rPr lang="en-US" dirty="0"/>
+              <a:t>Skipped previous comment</a:t>
+            </a:r>
+          </a:p>
+        </p:txBody>
+      </p:sp>
+      <p:sp>
+        <p:nvSpPr>
+          <p:cNvPr id="4" name="Slide Number Placeholder 3"/>
+          <p:cNvSpPr>
+            <a:spLocks noGrp="1"/>
+          </p:cNvSpPr>
+          <p:nvPr>
+            <p:ph type="sldNum" sz="quarter" idx="5"/>
+          </p:nvPr>
+        </p:nvSpPr>
+        <p:spPr/>
+        <p:txBody>
+          <a:bodyPr/>
+          <a:lstStyle/>
+          <a:p>
+            <a:fld id="{D4F25122-F43B-415E-BBCD-EA4B2BA820B8}" type="slidenum">
+              <a:rPr lang="en-US" smtClean="0"/>
+              <a:t>6</a:t>
             </a:fld>
             <a:endParaRPr lang="en-US"/>
           </a:p>
@@ -4485,6 +4597,86 @@
 </file>
 
 <file path=ppt/slides/slide5.xml><?xml version="1.0" encoding="utf-8"?>
+<p:sld xmlns:a="http://schemas.openxmlformats.org/drawingml/2006/main" xmlns:r="http://schemas.openxmlformats.org/officeDocument/2006/relationships" xmlns:p="http://schemas.openxmlformats.org/presentationml/2006/main">
+  <p:cSld>
+    <p:spTree>
+      <p:nvGrpSpPr>
+        <p:cNvPr id="1" name=""/>
+        <p:cNvGrpSpPr/>
+        <p:nvPr/>
+      </p:nvGrpSpPr>
+      <p:grpSpPr>
+        <a:xfrm>
+          <a:off x="0" y="0"/>
+          <a:ext cx="0" cy="0"/>
+          <a:chOff x="0" y="0"/>
+          <a:chExt cx="0" cy="0"/>
+        </a:xfrm>
+      </p:grpSpPr>
+      <p:sp>
+        <p:nvSpPr>
+          <p:cNvPr id="2" name="Title 1">
+            <a:extLst>
+              <a:ext uri="{FF2B5EF4-FFF2-40B4-BE49-F238E27FC236}">
+                <a16:creationId xmlns:a16="http://schemas.microsoft.com/office/drawing/2014/main" id="{95A2C7CE-D888-49A4-A050-374BA3E8369E}"/>
+              </a:ext>
+            </a:extLst>
+          </p:cNvPr>
+          <p:cNvSpPr>
+            <a:spLocks noGrp="1"/>
+          </p:cNvSpPr>
+          <p:nvPr>
+            <p:ph type="title"/>
+          </p:nvPr>
+        </p:nvSpPr>
+        <p:spPr/>
+        <p:txBody>
+          <a:bodyPr/>
+          <a:lstStyle/>
+          <a:p>
+            <a:endParaRPr lang="en-US"/>
+          </a:p>
+        </p:txBody>
+      </p:sp>
+      <p:sp>
+        <p:nvSpPr>
+          <p:cNvPr id="3" name="Content Placeholder 2">
+            <a:extLst>
+              <a:ext uri="{FF2B5EF4-FFF2-40B4-BE49-F238E27FC236}">
+                <a16:creationId xmlns:a16="http://schemas.microsoft.com/office/drawing/2014/main" id="{272D9615-6E58-40E8-A250-F89D96C55A68}"/>
+              </a:ext>
+            </a:extLst>
+          </p:cNvPr>
+          <p:cNvSpPr>
+            <a:spLocks noGrp="1"/>
+          </p:cNvSpPr>
+          <p:nvPr>
+            <p:ph idx="1"/>
+          </p:nvPr>
+        </p:nvSpPr>
+        <p:spPr/>
+        <p:txBody>
+          <a:bodyPr/>
+          <a:lstStyle/>
+          <a:p>
+            <a:endParaRPr lang="en-US"/>
+          </a:p>
+        </p:txBody>
+      </p:sp>
+    </p:spTree>
+    <p:extLst>
+      <p:ext uri="{BB962C8B-B14F-4D97-AF65-F5344CB8AC3E}">
+        <p14:creationId xmlns:p14="http://schemas.microsoft.com/office/powerpoint/2010/main" val="1249608323"/>
+      </p:ext>
+    </p:extLst>
+  </p:cSld>
+  <p:clrMapOvr>
+    <a:masterClrMapping/>
+  </p:clrMapOvr>
+</p:sld>
+</file>
+
+<file path=ppt/slides/slide6.xml><?xml version="1.0" encoding="utf-8"?>
 <p:sld xmlns:a="http://schemas.openxmlformats.org/drawingml/2006/main" xmlns:r="http://schemas.openxmlformats.org/officeDocument/2006/relationships" xmlns:p="http://schemas.openxmlformats.org/presentationml/2006/main">
   <p:cSld>
     <p:spTree>

</xml_diff>

<commit_message>
[update] 1. default values for ppt settings. But raises error if display_name key is not found. 2. set ideal title length and relative font size in _CONSTS_
</commit_message>
<xml_diff>
--- a/input/Course/w1/s1/u1/03_Hello_world_PPT_video.pptx
+++ b/input/Course/w1/s1/u1/03_Hello_world_PPT_video.pptx
@@ -133,12 +133,26 @@
   <pc:docChgLst>
     <pc:chgData name="Derek Pung" userId="7e88d8518b7a3141" providerId="LiveId" clId="{4160929A-66B3-4973-9BD4-E698E421CEF1}"/>
     <pc:docChg chg="custSel addSld modSld">
-      <pc:chgData name="Derek Pung" userId="7e88d8518b7a3141" providerId="LiveId" clId="{4160929A-66B3-4973-9BD4-E698E421CEF1}" dt="2019-12-05T11:33:09.792" v="58" actId="20577"/>
+      <pc:chgData name="Derek Pung" userId="7e88d8518b7a3141" providerId="LiveId" clId="{4160929A-66B3-4973-9BD4-E698E421CEF1}" dt="2019-12-10T04:14:22.186" v="205" actId="20577"/>
       <pc:docMkLst>
         <pc:docMk/>
       </pc:docMkLst>
+      <pc:sldChg chg="modNotesTx">
+        <pc:chgData name="Derek Pung" userId="7e88d8518b7a3141" providerId="LiveId" clId="{4160929A-66B3-4973-9BD4-E698E421CEF1}" dt="2019-12-10T04:08:45.488" v="204" actId="20577"/>
+        <pc:sldMkLst>
+          <pc:docMk/>
+          <pc:sldMk cId="2872330192" sldId="256"/>
+        </pc:sldMkLst>
+      </pc:sldChg>
+      <pc:sldChg chg="modNotesTx">
+        <pc:chgData name="Derek Pung" userId="7e88d8518b7a3141" providerId="LiveId" clId="{4160929A-66B3-4973-9BD4-E698E421CEF1}" dt="2019-12-10T04:14:22.186" v="205" actId="20577"/>
+        <pc:sldMkLst>
+          <pc:docMk/>
+          <pc:sldMk cId="3845012415" sldId="258"/>
+        </pc:sldMkLst>
+      </pc:sldChg>
       <pc:sldChg chg="add modNotesTx">
-        <pc:chgData name="Derek Pung" userId="7e88d8518b7a3141" providerId="LiveId" clId="{4160929A-66B3-4973-9BD4-E698E421CEF1}" dt="2019-12-05T04:47:26.972" v="32" actId="313"/>
+        <pc:chgData name="Derek Pung" userId="7e88d8518b7a3141" providerId="LiveId" clId="{4160929A-66B3-4973-9BD4-E698E421CEF1}" dt="2019-12-10T04:08:17.145" v="123" actId="20577"/>
         <pc:sldMkLst>
           <pc:docMk/>
           <pc:sldMk cId="2738298612" sldId="260"/>
@@ -238,7 +252,7 @@
           <a:p>
             <a:fld id="{1EE4D481-980E-49BF-85FB-F749DAA9CC8E}" type="datetimeFigureOut">
               <a:rPr lang="en-US" smtClean="0"/>
-              <a:t>12/5/2019</a:t>
+              <a:t>12/10/2019</a:t>
             </a:fld>
             <a:endParaRPr lang="en-US"/>
           </a:p>
@@ -555,19 +569,19 @@
             </a:r>
             <a:r>
               <a:rPr lang="en-US" dirty="0" err="1"/>
+              <a:t>display_name</a:t>
+            </a:r>
+            <a:r>
+              <a:rPr lang="en-US" dirty="0"/>
+              <a:t>”: “Test without </a:t>
+            </a:r>
+            <a:r>
+              <a:rPr lang="en-US" dirty="0" err="1"/>
               <a:t>video_file_name</a:t>
             </a:r>
             <a:r>
               <a:rPr lang="en-US" dirty="0"/>
-              <a:t>”: “03_Hello_world_PPT_video”, “</a:t>
-            </a:r>
-            <a:r>
-              <a:rPr lang="en-US" dirty="0" err="1"/>
-              <a:t>display_name</a:t>
-            </a:r>
-            <a:r>
-              <a:rPr lang="en-US" dirty="0"/>
-              <a:t>”: “Hello world”, “voice”: “3”}</a:t>
+              <a:t> and voice”}</a:t>
             </a:r>
           </a:p>
         </p:txBody>
@@ -654,7 +668,7 @@
           <a:p>
             <a:r>
               <a:rPr lang="en-US" dirty="0"/>
-              <a:t>This is a test</a:t>
+              <a:t>Voice should be default to 0 and file name default to file name of ppt</a:t>
             </a:r>
           </a:p>
         </p:txBody>
@@ -826,11 +840,7 @@
           <a:bodyPr/>
           <a:lstStyle/>
           <a:p>
-            <a:r>
-              <a:rPr lang="en-US"/>
-              <a:t>123</a:t>
-            </a:r>
-            <a:endParaRPr lang="en-SG"/>
+            <a:endParaRPr lang="en-SG" dirty="0"/>
           </a:p>
         </p:txBody>
       </p:sp>
@@ -1217,7 +1227,7 @@
           <a:p>
             <a:fld id="{35DC08F3-965F-4DEA-9B61-4E5F756BB3EE}" type="datetimeFigureOut">
               <a:rPr lang="en-US" smtClean="0"/>
-              <a:t>12/5/2019</a:t>
+              <a:t>12/10/2019</a:t>
             </a:fld>
             <a:endParaRPr lang="en-US"/>
           </a:p>
@@ -1415,7 +1425,7 @@
           <a:p>
             <a:fld id="{35DC08F3-965F-4DEA-9B61-4E5F756BB3EE}" type="datetimeFigureOut">
               <a:rPr lang="en-US" smtClean="0"/>
-              <a:t>12/5/2019</a:t>
+              <a:t>12/10/2019</a:t>
             </a:fld>
             <a:endParaRPr lang="en-US"/>
           </a:p>
@@ -1623,7 +1633,7 @@
           <a:p>
             <a:fld id="{35DC08F3-965F-4DEA-9B61-4E5F756BB3EE}" type="datetimeFigureOut">
               <a:rPr lang="en-US" smtClean="0"/>
-              <a:t>12/5/2019</a:t>
+              <a:t>12/10/2019</a:t>
             </a:fld>
             <a:endParaRPr lang="en-US"/>
           </a:p>
@@ -1821,7 +1831,7 @@
           <a:p>
             <a:fld id="{35DC08F3-965F-4DEA-9B61-4E5F756BB3EE}" type="datetimeFigureOut">
               <a:rPr lang="en-US" smtClean="0"/>
-              <a:t>12/5/2019</a:t>
+              <a:t>12/10/2019</a:t>
             </a:fld>
             <a:endParaRPr lang="en-US"/>
           </a:p>
@@ -2096,7 +2106,7 @@
           <a:p>
             <a:fld id="{35DC08F3-965F-4DEA-9B61-4E5F756BB3EE}" type="datetimeFigureOut">
               <a:rPr lang="en-US" smtClean="0"/>
-              <a:t>12/5/2019</a:t>
+              <a:t>12/10/2019</a:t>
             </a:fld>
             <a:endParaRPr lang="en-US"/>
           </a:p>
@@ -2361,7 +2371,7 @@
           <a:p>
             <a:fld id="{35DC08F3-965F-4DEA-9B61-4E5F756BB3EE}" type="datetimeFigureOut">
               <a:rPr lang="en-US" smtClean="0"/>
-              <a:t>12/5/2019</a:t>
+              <a:t>12/10/2019</a:t>
             </a:fld>
             <a:endParaRPr lang="en-US"/>
           </a:p>
@@ -2773,7 +2783,7 @@
           <a:p>
             <a:fld id="{35DC08F3-965F-4DEA-9B61-4E5F756BB3EE}" type="datetimeFigureOut">
               <a:rPr lang="en-US" smtClean="0"/>
-              <a:t>12/5/2019</a:t>
+              <a:t>12/10/2019</a:t>
             </a:fld>
             <a:endParaRPr lang="en-US"/>
           </a:p>
@@ -2914,7 +2924,7 @@
           <a:p>
             <a:fld id="{35DC08F3-965F-4DEA-9B61-4E5F756BB3EE}" type="datetimeFigureOut">
               <a:rPr lang="en-US" smtClean="0"/>
-              <a:t>12/5/2019</a:t>
+              <a:t>12/10/2019</a:t>
             </a:fld>
             <a:endParaRPr lang="en-US"/>
           </a:p>
@@ -3027,7 +3037,7 @@
           <a:p>
             <a:fld id="{35DC08F3-965F-4DEA-9B61-4E5F756BB3EE}" type="datetimeFigureOut">
               <a:rPr lang="en-US" smtClean="0"/>
-              <a:t>12/5/2019</a:t>
+              <a:t>12/10/2019</a:t>
             </a:fld>
             <a:endParaRPr lang="en-US"/>
           </a:p>
@@ -3338,7 +3348,7 @@
           <a:p>
             <a:fld id="{35DC08F3-965F-4DEA-9B61-4E5F756BB3EE}" type="datetimeFigureOut">
               <a:rPr lang="en-US" smtClean="0"/>
-              <a:t>12/5/2019</a:t>
+              <a:t>12/10/2019</a:t>
             </a:fld>
             <a:endParaRPr lang="en-US"/>
           </a:p>
@@ -3626,7 +3636,7 @@
           <a:p>
             <a:fld id="{35DC08F3-965F-4DEA-9B61-4E5F756BB3EE}" type="datetimeFigureOut">
               <a:rPr lang="en-US" smtClean="0"/>
-              <a:t>12/5/2019</a:t>
+              <a:t>12/10/2019</a:t>
             </a:fld>
             <a:endParaRPr lang="en-US"/>
           </a:p>
@@ -3867,7 +3877,7 @@
           <a:p>
             <a:fld id="{35DC08F3-965F-4DEA-9B61-4E5F756BB3EE}" type="datetimeFigureOut">
               <a:rPr lang="en-US" smtClean="0"/>
-              <a:t>12/5/2019</a:t>
+              <a:t>12/10/2019</a:t>
             </a:fld>
             <a:endParaRPr lang="en-US"/>
           </a:p>
@@ -4579,7 +4589,7 @@
           <a:bodyPr/>
           <a:lstStyle/>
           <a:p>
-            <a:endParaRPr lang="en-US"/>
+            <a:endParaRPr lang="en-US" dirty="0"/>
           </a:p>
         </p:txBody>
       </p:sp>

</xml_diff>